<commit_message>
Week 11 - 2nd commit - file name updated
</commit_message>
<xml_diff>
--- a/Week-11/CampaignCatalysts_EDA.pptx
+++ b/Week-11/CampaignCatalysts_EDA.pptx
@@ -5,7 +5,7 @@
     <p:sldMasterId id="2147483684" r:id="rId1"/>
   </p:sldMasterIdLst>
   <p:notesMasterIdLst>
-    <p:notesMasterId r:id="rId25"/>
+    <p:notesMasterId r:id="rId27"/>
   </p:notesMasterIdLst>
   <p:sldIdLst>
     <p:sldId id="320" r:id="rId2"/>
@@ -30,7 +30,9 @@
     <p:sldId id="283" r:id="rId21"/>
     <p:sldId id="316" r:id="rId22"/>
     <p:sldId id="329" r:id="rId23"/>
-    <p:sldId id="330" r:id="rId24"/>
+    <p:sldId id="331" r:id="rId24"/>
+    <p:sldId id="332" r:id="rId25"/>
+    <p:sldId id="330" r:id="rId26"/>
   </p:sldIdLst>
   <p:sldSz cx="12192000" cy="6858000"/>
   <p:notesSz cx="6858000" cy="9144000"/>
@@ -219,7 +221,7 @@
           <a:p>
             <a:fld id="{70C76DC8-EBD2-45F8-A083-055653C0A90B}" type="datetimeFigureOut">
               <a:rPr lang="en-US" smtClean="0"/>
-              <a:t>5/15/2023</a:t>
+              <a:t>5/16/2023</a:t>
             </a:fld>
             <a:endParaRPr lang="en-US"/>
           </a:p>
@@ -615,7 +617,7 @@
           <a:p>
             <a:fld id="{F247015B-67BB-48BA-9005-903D34B24DDF}" type="datetime1">
               <a:rPr lang="en-US" smtClean="0"/>
-              <a:t>5/15/2023</a:t>
+              <a:t>5/16/2023</a:t>
             </a:fld>
             <a:endParaRPr lang="en-US"/>
           </a:p>
@@ -786,7 +788,7 @@
           <a:p>
             <a:fld id="{2F61CEEA-37EC-40EC-860B-18659269F527}" type="datetime1">
               <a:rPr lang="en-US" smtClean="0"/>
-              <a:t>5/15/2023</a:t>
+              <a:t>5/16/2023</a:t>
             </a:fld>
             <a:endParaRPr lang="en-US"/>
           </a:p>
@@ -967,7 +969,7 @@
           <a:p>
             <a:fld id="{A27803A0-E9AA-405E-8885-ECA00FC6F6F5}" type="datetime1">
               <a:rPr lang="en-US" smtClean="0"/>
-              <a:t>5/15/2023</a:t>
+              <a:t>5/16/2023</a:t>
             </a:fld>
             <a:endParaRPr lang="en-US"/>
           </a:p>
@@ -1138,7 +1140,7 @@
           <a:p>
             <a:fld id="{9D8F47E4-7F99-4EDF-8B5D-434341E92EB7}" type="datetime1">
               <a:rPr lang="en-US" smtClean="0"/>
-              <a:t>5/15/2023</a:t>
+              <a:t>5/16/2023</a:t>
             </a:fld>
             <a:endParaRPr lang="en-US"/>
           </a:p>
@@ -1386,7 +1388,7 @@
           <a:p>
             <a:fld id="{BC3C34E7-BDA3-4D92-BB79-54E12D2FFF45}" type="datetime1">
               <a:rPr lang="en-US" smtClean="0"/>
-              <a:t>5/15/2023</a:t>
+              <a:t>5/16/2023</a:t>
             </a:fld>
             <a:endParaRPr lang="en-US"/>
           </a:p>
@@ -1618,7 +1620,7 @@
           <a:p>
             <a:fld id="{F42C0769-FB1B-4E4C-8D13-67FECA336992}" type="datetime1">
               <a:rPr lang="en-US" smtClean="0"/>
-              <a:t>5/15/2023</a:t>
+              <a:t>5/16/2023</a:t>
             </a:fld>
             <a:endParaRPr lang="en-US"/>
           </a:p>
@@ -1985,7 +1987,7 @@
           <a:p>
             <a:fld id="{5F102F82-A3EF-4054-9D44-A54720463C65}" type="datetime1">
               <a:rPr lang="en-US" smtClean="0"/>
-              <a:t>5/15/2023</a:t>
+              <a:t>5/16/2023</a:t>
             </a:fld>
             <a:endParaRPr lang="en-US"/>
           </a:p>
@@ -2105,7 +2107,7 @@
           <a:p>
             <a:fld id="{2FBB65D6-46A7-4946-9F4A-F926FBEF4D32}" type="datetime1">
               <a:rPr lang="en-US" smtClean="0"/>
-              <a:t>5/15/2023</a:t>
+              <a:t>5/16/2023</a:t>
             </a:fld>
             <a:endParaRPr lang="en-US"/>
           </a:p>
@@ -2203,7 +2205,7 @@
           <a:p>
             <a:fld id="{EF8237C5-023F-40DF-A487-854F9A4D693E}" type="datetime1">
               <a:rPr lang="en-US" smtClean="0"/>
-              <a:t>5/15/2023</a:t>
+              <a:t>5/16/2023</a:t>
             </a:fld>
             <a:endParaRPr lang="en-US"/>
           </a:p>
@@ -2481,7 +2483,7 @@
           <a:p>
             <a:fld id="{E0B5E189-B678-46C8-BC62-5C7F09E1A329}" type="datetime1">
               <a:rPr lang="en-US" smtClean="0"/>
-              <a:t>5/15/2023</a:t>
+              <a:t>5/16/2023</a:t>
             </a:fld>
             <a:endParaRPr lang="en-US"/>
           </a:p>
@@ -2739,7 +2741,7 @@
           <a:p>
             <a:fld id="{AF4470D9-78BC-4616-9F64-43C63B8E14F8}" type="datetime1">
               <a:rPr lang="en-US" smtClean="0"/>
-              <a:t>5/15/2023</a:t>
+              <a:t>5/16/2023</a:t>
             </a:fld>
             <a:endParaRPr lang="en-US"/>
           </a:p>
@@ -2953,7 +2955,7 @@
           <a:p>
             <a:fld id="{98E02B5D-E1D0-410B-A279-CB92E398A028}" type="datetime1">
               <a:rPr lang="en-US" smtClean="0"/>
-              <a:t>5/15/2023</a:t>
+              <a:t>5/16/2023</a:t>
             </a:fld>
             <a:endParaRPr lang="en-US"/>
           </a:p>
@@ -3677,15 +3679,7 @@
           <a:p>
             <a:r>
               <a:rPr lang="en-GB" dirty="0" smtClean="0"/>
-              <a:t>           </a:t>
-            </a:r>
-            <a:r>
-              <a:rPr lang="en-GB" dirty="0" smtClean="0"/>
-              <a:t>Cleaned </a:t>
-            </a:r>
-            <a:r>
-              <a:rPr lang="en-GB" dirty="0" smtClean="0"/>
-              <a:t>Data: </a:t>
+              <a:t>           Cleaned Data: </a:t>
             </a:r>
           </a:p>
           <a:p>
@@ -4459,7 +4453,7 @@
         <p:spPr>
           <a:xfrm>
             <a:off x="369455" y="120073"/>
-            <a:ext cx="6991927" cy="584775"/>
+            <a:ext cx="6991927" cy="523220"/>
           </a:xfrm>
           <a:prstGeom prst="rect">
             <a:avLst/>
@@ -4473,13 +4467,26 @@
           <a:lstStyle/>
           <a:p>
             <a:r>
-              <a:rPr lang="en-GB" sz="3200" dirty="0">
+              <a:rPr lang="en-GB" sz="2800" dirty="0">
                 <a:solidFill>
                   <a:schemeClr val="accent2"/>
                 </a:solidFill>
               </a:rPr>
-              <a:t>Data Preparation-EDA of Features</a:t>
-            </a:r>
+              <a:t>Data Preparation-EDA of </a:t>
+            </a:r>
+            <a:r>
+              <a:rPr lang="en-GB" sz="2800" dirty="0" smtClean="0">
+                <a:solidFill>
+                  <a:schemeClr val="accent2"/>
+                </a:solidFill>
+              </a:rPr>
+              <a:t>Numerical Features</a:t>
+            </a:r>
+            <a:endParaRPr lang="en-GB" sz="2800" dirty="0">
+              <a:solidFill>
+                <a:schemeClr val="accent2"/>
+              </a:solidFill>
+            </a:endParaRPr>
           </a:p>
         </p:txBody>
       </p:sp>
@@ -4570,7 +4577,7 @@
         <p:spPr>
           <a:xfrm>
             <a:off x="840509" y="314036"/>
-            <a:ext cx="6825673" cy="584775"/>
+            <a:ext cx="6825673" cy="523220"/>
           </a:xfrm>
           <a:prstGeom prst="rect">
             <a:avLst/>
@@ -4584,13 +4591,26 @@
           <a:lstStyle/>
           <a:p>
             <a:r>
-              <a:rPr lang="en-GB" sz="3200" dirty="0">
+              <a:rPr lang="en-GB" sz="2800" dirty="0">
                 <a:solidFill>
                   <a:schemeClr val="accent2"/>
                 </a:solidFill>
               </a:rPr>
-              <a:t>Data Preparation-EDA of Features</a:t>
-            </a:r>
+              <a:t>Data Preparation-EDA of </a:t>
+            </a:r>
+            <a:r>
+              <a:rPr lang="en-GB" sz="2800" dirty="0" smtClean="0">
+                <a:solidFill>
+                  <a:schemeClr val="accent2"/>
+                </a:solidFill>
+              </a:rPr>
+              <a:t>Numerical Features</a:t>
+            </a:r>
+            <a:endParaRPr lang="en-GB" sz="2800" dirty="0">
+              <a:solidFill>
+                <a:schemeClr val="accent2"/>
+              </a:solidFill>
+            </a:endParaRPr>
           </a:p>
         </p:txBody>
       </p:sp>
@@ -4824,7 +4844,7 @@
         <p:spPr>
           <a:xfrm>
             <a:off x="671946" y="259929"/>
-            <a:ext cx="8564418" cy="584775"/>
+            <a:ext cx="8564418" cy="523220"/>
           </a:xfrm>
           <a:prstGeom prst="rect">
             <a:avLst/>
@@ -4838,13 +4858,26 @@
           <a:lstStyle/>
           <a:p>
             <a:r>
-              <a:rPr lang="en-GB" sz="3200" dirty="0">
+              <a:rPr lang="en-GB" sz="2800" dirty="0">
                 <a:solidFill>
                   <a:schemeClr val="accent2"/>
                 </a:solidFill>
               </a:rPr>
-              <a:t>Data Preparation-EDA of Features</a:t>
-            </a:r>
+              <a:t>Data Preparation-EDA of </a:t>
+            </a:r>
+            <a:r>
+              <a:rPr lang="en-GB" sz="2800" dirty="0" smtClean="0">
+                <a:solidFill>
+                  <a:schemeClr val="accent2"/>
+                </a:solidFill>
+              </a:rPr>
+              <a:t>Numerical Features</a:t>
+            </a:r>
+            <a:endParaRPr lang="en-GB" sz="2800" dirty="0">
+              <a:solidFill>
+                <a:schemeClr val="accent2"/>
+              </a:solidFill>
+            </a:endParaRPr>
           </a:p>
         </p:txBody>
       </p:sp>
@@ -4907,16 +4940,16 @@
           <a:lstStyle/>
           <a:p>
             <a:r>
-              <a:rPr lang="en-US" sz="3200" dirty="0">
+              <a:rPr lang="en-US" sz="2800" dirty="0">
                 <a:solidFill>
-                  <a:srgbClr val="FF0000"/>
+                  <a:schemeClr val="accent2"/>
                 </a:solidFill>
               </a:rPr>
               <a:t>Visualizing distributions for each category of target variable: </a:t>
             </a:r>
-            <a:endParaRPr lang="en-US" sz="3200" b="1" dirty="0">
+            <a:endParaRPr lang="en-US" sz="2800" b="1" dirty="0">
               <a:solidFill>
-                <a:srgbClr val="FF0000"/>
+                <a:schemeClr val="accent2"/>
               </a:solidFill>
             </a:endParaRPr>
           </a:p>
@@ -5079,6 +5112,55 @@
           </a:prstGeom>
         </p:spPr>
       </p:pic>
+      <p:sp>
+        <p:nvSpPr>
+          <p:cNvPr id="3" name="TextBox 2"/>
+          <p:cNvSpPr txBox="1"/>
+          <p:nvPr/>
+        </p:nvSpPr>
+        <p:spPr>
+          <a:xfrm>
+            <a:off x="914400" y="182880"/>
+            <a:ext cx="9492343" cy="523220"/>
+          </a:xfrm>
+          <a:prstGeom prst="rect">
+            <a:avLst/>
+          </a:prstGeom>
+          <a:noFill/>
+        </p:spPr>
+        <p:txBody>
+          <a:bodyPr wrap="square" rtlCol="0">
+            <a:spAutoFit/>
+          </a:bodyPr>
+          <a:lstStyle/>
+          <a:p>
+            <a:r>
+              <a:rPr lang="en-GB" sz="2800" dirty="0">
+                <a:solidFill>
+                  <a:schemeClr val="accent2"/>
+                </a:solidFill>
+              </a:rPr>
+              <a:t>Data Preparation-EDA of </a:t>
+            </a:r>
+            <a:r>
+              <a:rPr lang="en-GB" sz="2800" dirty="0" smtClean="0">
+                <a:solidFill>
+                  <a:schemeClr val="accent2"/>
+                </a:solidFill>
+              </a:rPr>
+              <a:t>Categorical </a:t>
+            </a:r>
+            <a:r>
+              <a:rPr lang="en-GB" sz="2800" dirty="0">
+                <a:solidFill>
+                  <a:schemeClr val="accent2"/>
+                </a:solidFill>
+              </a:rPr>
+              <a:t>Features</a:t>
+            </a:r>
+          </a:p>
+        </p:txBody>
+      </p:sp>
     </p:spTree>
     <p:extLst>
       <p:ext uri="{BB962C8B-B14F-4D97-AF65-F5344CB8AC3E}">
@@ -5431,8 +5513,8 @@
         </p:nvSpPr>
         <p:spPr>
           <a:xfrm>
-            <a:off x="609600" y="240145"/>
-            <a:ext cx="8820727" cy="584775"/>
+            <a:off x="700391" y="290249"/>
+            <a:ext cx="8820727" cy="523220"/>
           </a:xfrm>
           <a:prstGeom prst="rect">
             <a:avLst/>
@@ -5446,13 +5528,26 @@
           <a:lstStyle/>
           <a:p>
             <a:r>
-              <a:rPr lang="en-GB" sz="3200" dirty="0">
+              <a:rPr lang="en-GB" sz="2800" dirty="0">
                 <a:solidFill>
                   <a:schemeClr val="accent2"/>
                 </a:solidFill>
               </a:rPr>
-              <a:t>Data Preparation-EDA of Features</a:t>
-            </a:r>
+              <a:t>Data Preparation-EDA of </a:t>
+            </a:r>
+            <a:r>
+              <a:rPr lang="en-GB" sz="2800" dirty="0" smtClean="0">
+                <a:solidFill>
+                  <a:schemeClr val="accent2"/>
+                </a:solidFill>
+              </a:rPr>
+              <a:t>Categorical Features</a:t>
+            </a:r>
+            <a:endParaRPr lang="en-GB" sz="2800" dirty="0">
+              <a:solidFill>
+                <a:schemeClr val="accent2"/>
+              </a:solidFill>
+            </a:endParaRPr>
           </a:p>
         </p:txBody>
       </p:sp>
@@ -5664,7 +5759,7 @@
         <p:spPr>
           <a:xfrm>
             <a:off x="350982" y="92364"/>
-            <a:ext cx="9134763" cy="584775"/>
+            <a:ext cx="9134763" cy="523220"/>
           </a:xfrm>
           <a:prstGeom prst="rect">
             <a:avLst/>
@@ -5678,13 +5773,26 @@
           <a:lstStyle/>
           <a:p>
             <a:r>
-              <a:rPr lang="en-GB" sz="3200" dirty="0">
+              <a:rPr lang="en-GB" sz="2800" dirty="0">
                 <a:solidFill>
                   <a:schemeClr val="accent2"/>
                 </a:solidFill>
               </a:rPr>
-              <a:t>Data Preparation-EDA of Features</a:t>
-            </a:r>
+              <a:t>Data Preparation-EDA of </a:t>
+            </a:r>
+            <a:r>
+              <a:rPr lang="en-GB" sz="2800" dirty="0" smtClean="0">
+                <a:solidFill>
+                  <a:schemeClr val="accent2"/>
+                </a:solidFill>
+              </a:rPr>
+              <a:t>Categorical Features</a:t>
+            </a:r>
+            <a:endParaRPr lang="en-GB" sz="2800" dirty="0">
+              <a:solidFill>
+                <a:schemeClr val="accent2"/>
+              </a:solidFill>
+            </a:endParaRPr>
           </a:p>
         </p:txBody>
       </p:sp>
@@ -5732,7 +5840,7 @@
         </p:nvSpPr>
         <p:spPr>
           <a:xfrm>
-            <a:off x="8424153" y="3099942"/>
+            <a:off x="8372034" y="3403187"/>
             <a:ext cx="3560323" cy="3323987"/>
           </a:xfrm>
           <a:prstGeom prst="rect">
@@ -5813,7 +5921,7 @@
         </p:blipFill>
         <p:spPr>
           <a:xfrm>
-            <a:off x="0" y="185103"/>
+            <a:off x="91764" y="708297"/>
             <a:ext cx="8153400" cy="4849326"/>
           </a:xfrm>
           <a:prstGeom prst="rect">
@@ -5837,7 +5945,7 @@
         </p:blipFill>
         <p:spPr>
           <a:xfrm>
-            <a:off x="8153400" y="185103"/>
+            <a:off x="7934766" y="675280"/>
             <a:ext cx="3997591" cy="2457680"/>
           </a:xfrm>
           <a:prstGeom prst="rect">
@@ -5859,7 +5967,7 @@
         </p:nvSpPr>
         <p:spPr>
           <a:xfrm>
-            <a:off x="671208" y="5392085"/>
+            <a:off x="427368" y="5557623"/>
             <a:ext cx="7482192" cy="1169551"/>
           </a:xfrm>
           <a:prstGeom prst="rect">
@@ -5906,6 +6014,52 @@
               <a:t>: The outcome of previous campaigns was "nonexistent" for most of the contacts. Although, the success of previous campaigns did seem to positively impact the subscriptions of current campaign</a:t>
             </a:r>
             <a:endParaRPr lang="en-US" sz="1400" b="1" dirty="0"/>
+          </a:p>
+        </p:txBody>
+      </p:sp>
+      <p:sp>
+        <p:nvSpPr>
+          <p:cNvPr id="2" name="TextBox 1"/>
+          <p:cNvSpPr txBox="1"/>
+          <p:nvPr/>
+        </p:nvSpPr>
+        <p:spPr>
+          <a:xfrm>
+            <a:off x="682365" y="197153"/>
+            <a:ext cx="7689669" cy="523220"/>
+          </a:xfrm>
+          <a:prstGeom prst="rect">
+            <a:avLst/>
+          </a:prstGeom>
+          <a:noFill/>
+        </p:spPr>
+        <p:txBody>
+          <a:bodyPr wrap="square" rtlCol="0">
+            <a:spAutoFit/>
+          </a:bodyPr>
+          <a:lstStyle/>
+          <a:p>
+            <a:r>
+              <a:rPr lang="en-GB" sz="2800" dirty="0">
+                <a:solidFill>
+                  <a:schemeClr val="accent2"/>
+                </a:solidFill>
+              </a:rPr>
+              <a:t>Data Preparation-EDA of </a:t>
+            </a:r>
+            <a:r>
+              <a:rPr lang="en-GB" sz="2800" dirty="0" smtClean="0">
+                <a:solidFill>
+                  <a:schemeClr val="accent2"/>
+                </a:solidFill>
+              </a:rPr>
+              <a:t>Categorical Features</a:t>
+            </a:r>
+            <a:endParaRPr lang="en-GB" sz="2800" dirty="0">
+              <a:solidFill>
+                <a:schemeClr val="accent2"/>
+              </a:solidFill>
+            </a:endParaRPr>
           </a:p>
         </p:txBody>
       </p:sp>
@@ -6506,6 +6660,1406 @@
 </file>
 
 <file path=ppt/slides/slide23.xml><?xml version="1.0" encoding="utf-8"?>
+<p:sld xmlns:a="http://schemas.openxmlformats.org/drawingml/2006/main" xmlns:r="http://schemas.openxmlformats.org/officeDocument/2006/relationships" xmlns:p="http://schemas.openxmlformats.org/presentationml/2006/main">
+  <p:cSld>
+    <p:spTree>
+      <p:nvGrpSpPr>
+        <p:cNvPr id="1" name=""/>
+        <p:cNvGrpSpPr/>
+        <p:nvPr/>
+      </p:nvGrpSpPr>
+      <p:grpSpPr>
+        <a:xfrm>
+          <a:off x="0" y="0"/>
+          <a:ext cx="0" cy="0"/>
+          <a:chOff x="0" y="0"/>
+          <a:chExt cx="0" cy="0"/>
+        </a:xfrm>
+      </p:grpSpPr>
+      <p:sp>
+        <p:nvSpPr>
+          <p:cNvPr id="5" name="TextBox 4"/>
+          <p:cNvSpPr txBox="1"/>
+          <p:nvPr/>
+        </p:nvSpPr>
+        <p:spPr>
+          <a:xfrm>
+            <a:off x="0" y="0"/>
+            <a:ext cx="3002145" cy="6858000"/>
+          </a:xfrm>
+          <a:prstGeom prst="rect">
+            <a:avLst/>
+          </a:prstGeom>
+          <a:solidFill>
+            <a:srgbClr val="3B3B3B"/>
+          </a:solidFill>
+        </p:spPr>
+        <p:txBody>
+          <a:bodyPr wrap="square" rtlCol="0">
+            <a:spAutoFit/>
+          </a:bodyPr>
+          <a:lstStyle/>
+          <a:p>
+            <a:endParaRPr lang="en-GB" dirty="0"/>
+          </a:p>
+        </p:txBody>
+      </p:sp>
+      <p:pic>
+        <p:nvPicPr>
+          <p:cNvPr id="6" name="Picture 5"/>
+          <p:cNvPicPr>
+            <a:picLocks noChangeAspect="1"/>
+          </p:cNvPicPr>
+          <p:nvPr/>
+        </p:nvPicPr>
+        <p:blipFill>
+          <a:blip r:embed="rId2"/>
+          <a:stretch>
+            <a:fillRect/>
+          </a:stretch>
+        </p:blipFill>
+        <p:spPr>
+          <a:xfrm>
+            <a:off x="176495" y="-729821"/>
+            <a:ext cx="2322777" cy="2475191"/>
+          </a:xfrm>
+          <a:prstGeom prst="rect">
+            <a:avLst/>
+          </a:prstGeom>
+        </p:spPr>
+      </p:pic>
+      <p:sp>
+        <p:nvSpPr>
+          <p:cNvPr id="2" name="Rectangle 1"/>
+          <p:cNvSpPr/>
+          <p:nvPr/>
+        </p:nvSpPr>
+        <p:spPr>
+          <a:xfrm>
+            <a:off x="3415994" y="82771"/>
+            <a:ext cx="4038863" cy="584775"/>
+          </a:xfrm>
+          <a:prstGeom prst="rect">
+            <a:avLst/>
+          </a:prstGeom>
+        </p:spPr>
+        <p:txBody>
+          <a:bodyPr wrap="none">
+            <a:spAutoFit/>
+          </a:bodyPr>
+          <a:lstStyle/>
+          <a:p>
+            <a:r>
+              <a:rPr lang="en-GB" sz="3200" dirty="0">
+                <a:solidFill>
+                  <a:srgbClr val="FF6600"/>
+                </a:solidFill>
+              </a:rPr>
+              <a:t>Recommended Models</a:t>
+            </a:r>
+          </a:p>
+        </p:txBody>
+      </p:sp>
+      <p:sp>
+        <p:nvSpPr>
+          <p:cNvPr id="3" name="Rectangle 2"/>
+          <p:cNvSpPr/>
+          <p:nvPr/>
+        </p:nvSpPr>
+        <p:spPr>
+          <a:xfrm>
+            <a:off x="3415994" y="667546"/>
+            <a:ext cx="8406812" cy="523220"/>
+          </a:xfrm>
+          <a:prstGeom prst="rect">
+            <a:avLst/>
+          </a:prstGeom>
+        </p:spPr>
+        <p:txBody>
+          <a:bodyPr wrap="square">
+            <a:spAutoFit/>
+          </a:bodyPr>
+          <a:lstStyle/>
+          <a:p>
+            <a:endParaRPr lang="en-GB" sz="1400" dirty="0"/>
+          </a:p>
+          <a:p>
+            <a:endParaRPr lang="en-GB" sz="1400" dirty="0"/>
+          </a:p>
+        </p:txBody>
+      </p:sp>
+      <p:sp>
+        <p:nvSpPr>
+          <p:cNvPr id="7" name="TextBox 6">
+            <a:extLst>
+              <a:ext uri="{FF2B5EF4-FFF2-40B4-BE49-F238E27FC236}">
+                <a16:creationId xmlns:a16="http://schemas.microsoft.com/office/drawing/2014/main" id="{AB004D54-61DF-EB04-3FF0-2B3A7256AE57}"/>
+              </a:ext>
+            </a:extLst>
+          </p:cNvPr>
+          <p:cNvSpPr txBox="1"/>
+          <p:nvPr/>
+        </p:nvSpPr>
+        <p:spPr>
+          <a:xfrm>
+            <a:off x="3415994" y="762009"/>
+            <a:ext cx="8406812" cy="923330"/>
+          </a:xfrm>
+          <a:prstGeom prst="rect">
+            <a:avLst/>
+          </a:prstGeom>
+          <a:noFill/>
+        </p:spPr>
+        <p:txBody>
+          <a:bodyPr wrap="square">
+            <a:spAutoFit/>
+          </a:bodyPr>
+          <a:lstStyle/>
+          <a:p>
+            <a:r>
+              <a:rPr lang="en-GB" sz="1800" b="1" dirty="0">
+                <a:solidFill>
+                  <a:schemeClr val="accent2">
+                    <a:lumMod val="75000"/>
+                  </a:schemeClr>
+                </a:solidFill>
+              </a:rPr>
+              <a:t>We have 8 categorical Variables and 7 numeric variables in the data after cleaning the data in week 10. We can make these models in the upcoming weeks:</a:t>
+            </a:r>
+            <a:r>
+              <a:rPr lang="en-IN" sz="1800" dirty="0">
+                <a:solidFill>
+                  <a:schemeClr val="accent2">
+                    <a:lumMod val="75000"/>
+                  </a:schemeClr>
+                </a:solidFill>
+              </a:rPr>
+              <a:t/>
+            </a:r>
+            <a:br>
+              <a:rPr lang="en-IN" sz="1800" dirty="0">
+                <a:solidFill>
+                  <a:schemeClr val="accent2">
+                    <a:lumMod val="75000"/>
+                  </a:schemeClr>
+                </a:solidFill>
+              </a:rPr>
+            </a:br>
+            <a:endParaRPr lang="en-AE" dirty="0"/>
+          </a:p>
+        </p:txBody>
+      </p:sp>
+      <p:sp>
+        <p:nvSpPr>
+          <p:cNvPr id="9" name="Rectangle 8">
+            <a:extLst>
+              <a:ext uri="{FF2B5EF4-FFF2-40B4-BE49-F238E27FC236}">
+                <a16:creationId xmlns:a16="http://schemas.microsoft.com/office/drawing/2014/main" id="{809C399F-76A3-5E11-E81A-DF0413B0AEB0}"/>
+              </a:ext>
+            </a:extLst>
+          </p:cNvPr>
+          <p:cNvSpPr/>
+          <p:nvPr/>
+        </p:nvSpPr>
+        <p:spPr>
+          <a:xfrm>
+            <a:off x="3415994" y="1616016"/>
+            <a:ext cx="8406812" cy="923779"/>
+          </a:xfrm>
+          <a:prstGeom prst="rect">
+            <a:avLst/>
+          </a:prstGeom>
+          <a:solidFill>
+            <a:schemeClr val="accent2">
+              <a:lumMod val="60000"/>
+              <a:lumOff val="40000"/>
+            </a:schemeClr>
+          </a:solidFill>
+        </p:spPr>
+        <p:txBody>
+          <a:bodyPr wrap="square">
+            <a:spAutoFit/>
+          </a:bodyPr>
+          <a:lstStyle/>
+          <a:p>
+            <a:pPr marL="342900" marR="228600" lvl="0" indent="-342900" fontAlgn="base">
+              <a:lnSpc>
+                <a:spcPct val="115000"/>
+              </a:lnSpc>
+              <a:spcBef>
+                <a:spcPts val="600"/>
+              </a:spcBef>
+              <a:spcAft>
+                <a:spcPts val="0"/>
+              </a:spcAft>
+              <a:buClr>
+                <a:srgbClr val="1F1F1F"/>
+              </a:buClr>
+              <a:buSzPts val="1200"/>
+              <a:buFont typeface="Arial" panose="020B0604020202020204" pitchFamily="34" charset="0"/>
+              <a:buChar char="●"/>
+            </a:pPr>
+            <a:r>
+              <a:rPr lang="en-GB" sz="1200" b="1" dirty="0">
+                <a:solidFill>
+                  <a:srgbClr val="1F1F1F"/>
+                </a:solidFill>
+                <a:latin typeface="Arial" panose="020B0604020202020204" pitchFamily="34" charset="0"/>
+                <a:ea typeface="Arial" panose="020B0604020202020204" pitchFamily="34" charset="0"/>
+                <a:cs typeface="Arial" panose="020B0604020202020204" pitchFamily="34" charset="0"/>
+              </a:rPr>
+              <a:t>Logistic regression</a:t>
+            </a:r>
+            <a:r>
+              <a:rPr lang="en-GB" sz="1200" dirty="0">
+                <a:solidFill>
+                  <a:srgbClr val="1F1F1F"/>
+                </a:solidFill>
+                <a:latin typeface="Arial" panose="020B0604020202020204" pitchFamily="34" charset="0"/>
+                <a:ea typeface="Arial" panose="020B0604020202020204" pitchFamily="34" charset="0"/>
+                <a:cs typeface="Arial" panose="020B0604020202020204" pitchFamily="34" charset="0"/>
+              </a:rPr>
+              <a:t>: Logistic regression is a simple but effective model for binary classification problems. It is easy to interpret and can be used to understand the relationship between the features and the target variable.</a:t>
+            </a:r>
+            <a:endParaRPr lang="en-IN" sz="1100" dirty="0">
+              <a:latin typeface="Arial" panose="020B0604020202020204" pitchFamily="34" charset="0"/>
+              <a:ea typeface="Arial" panose="020B0604020202020204" pitchFamily="34" charset="0"/>
+              <a:cs typeface="Arial" panose="020B0604020202020204" pitchFamily="34" charset="0"/>
+            </a:endParaRPr>
+          </a:p>
+          <a:p>
+            <a:pPr marL="742950" marR="228600" lvl="1" indent="-285750" fontAlgn="base">
+              <a:lnSpc>
+                <a:spcPct val="115000"/>
+              </a:lnSpc>
+              <a:spcAft>
+                <a:spcPts val="0"/>
+              </a:spcAft>
+              <a:buClr>
+                <a:srgbClr val="000000"/>
+              </a:buClr>
+              <a:buSzPts val="1100"/>
+              <a:buFont typeface="+mj-lt"/>
+              <a:buAutoNum type="alphaLcPeriod"/>
+            </a:pPr>
+            <a:r>
+              <a:rPr lang="en-GB" sz="1200" dirty="0">
+                <a:solidFill>
+                  <a:srgbClr val="1F1F1F"/>
+                </a:solidFill>
+                <a:latin typeface="Arial" panose="020B0604020202020204" pitchFamily="34" charset="0"/>
+                <a:ea typeface="Arial" panose="020B0604020202020204" pitchFamily="34" charset="0"/>
+                <a:cs typeface="Arial" panose="020B0604020202020204" pitchFamily="34" charset="0"/>
+              </a:rPr>
+              <a:t>It is a simple and easy-to-understand model.</a:t>
+            </a:r>
+            <a:endParaRPr lang="en-IN" sz="1100" dirty="0">
+              <a:latin typeface="Arial" panose="020B0604020202020204" pitchFamily="34" charset="0"/>
+              <a:ea typeface="Arial" panose="020B0604020202020204" pitchFamily="34" charset="0"/>
+              <a:cs typeface="Arial" panose="020B0604020202020204" pitchFamily="34" charset="0"/>
+            </a:endParaRPr>
+          </a:p>
+          <a:p>
+            <a:pPr marL="742950" marR="228600" lvl="1" indent="-285750" fontAlgn="base">
+              <a:lnSpc>
+                <a:spcPct val="115000"/>
+              </a:lnSpc>
+              <a:spcAft>
+                <a:spcPts val="0"/>
+              </a:spcAft>
+              <a:buClr>
+                <a:srgbClr val="000000"/>
+              </a:buClr>
+              <a:buSzPts val="1100"/>
+              <a:buFont typeface="+mj-lt"/>
+              <a:buAutoNum type="alphaLcPeriod"/>
+            </a:pPr>
+            <a:r>
+              <a:rPr lang="en-GB" sz="1200" dirty="0">
+                <a:solidFill>
+                  <a:srgbClr val="1F1F1F"/>
+                </a:solidFill>
+                <a:latin typeface="Arial" panose="020B0604020202020204" pitchFamily="34" charset="0"/>
+                <a:ea typeface="Arial" panose="020B0604020202020204" pitchFamily="34" charset="0"/>
+                <a:cs typeface="Arial" panose="020B0604020202020204" pitchFamily="34" charset="0"/>
+              </a:rPr>
+              <a:t>It is relatively fast to train.</a:t>
+            </a:r>
+          </a:p>
+        </p:txBody>
+      </p:sp>
+      <p:sp>
+        <p:nvSpPr>
+          <p:cNvPr id="10" name="Rectangle 9">
+            <a:extLst>
+              <a:ext uri="{FF2B5EF4-FFF2-40B4-BE49-F238E27FC236}">
+                <a16:creationId xmlns:a16="http://schemas.microsoft.com/office/drawing/2014/main" id="{687B90B7-5701-CB33-9FB0-0D8F1FCDE1D3}"/>
+              </a:ext>
+            </a:extLst>
+          </p:cNvPr>
+          <p:cNvSpPr/>
+          <p:nvPr/>
+        </p:nvSpPr>
+        <p:spPr>
+          <a:xfrm>
+            <a:off x="3415994" y="2539795"/>
+            <a:ext cx="8406812" cy="4179029"/>
+          </a:xfrm>
+          <a:prstGeom prst="rect">
+            <a:avLst/>
+          </a:prstGeom>
+          <a:solidFill>
+            <a:schemeClr val="accent2">
+              <a:lumMod val="60000"/>
+              <a:lumOff val="40000"/>
+            </a:schemeClr>
+          </a:solidFill>
+        </p:spPr>
+        <p:txBody>
+          <a:bodyPr wrap="square">
+            <a:spAutoFit/>
+          </a:bodyPr>
+          <a:lstStyle/>
+          <a:p>
+            <a:pPr marL="342900" marR="228600" lvl="0" indent="-342900" fontAlgn="base">
+              <a:lnSpc>
+                <a:spcPct val="115000"/>
+              </a:lnSpc>
+              <a:spcBef>
+                <a:spcPts val="600"/>
+              </a:spcBef>
+              <a:spcAft>
+                <a:spcPts val="0"/>
+              </a:spcAft>
+              <a:buClr>
+                <a:srgbClr val="1F1F1F"/>
+              </a:buClr>
+              <a:buSzPts val="1200"/>
+              <a:buFont typeface="Arial" panose="020B0604020202020204" pitchFamily="34" charset="0"/>
+              <a:buChar char="●"/>
+            </a:pPr>
+            <a:r>
+              <a:rPr lang="en-GB" sz="1200" b="1" dirty="0">
+                <a:solidFill>
+                  <a:srgbClr val="1F1F1F"/>
+                </a:solidFill>
+                <a:latin typeface="Arial" panose="020B0604020202020204" pitchFamily="34" charset="0"/>
+                <a:ea typeface="Arial" panose="020B0604020202020204" pitchFamily="34" charset="0"/>
+                <a:cs typeface="Arial" panose="020B0604020202020204" pitchFamily="34" charset="0"/>
+              </a:rPr>
+              <a:t>Random forest</a:t>
+            </a:r>
+            <a:r>
+              <a:rPr lang="en-GB" sz="1200" dirty="0">
+                <a:solidFill>
+                  <a:srgbClr val="1F1F1F"/>
+                </a:solidFill>
+                <a:latin typeface="Arial" panose="020B0604020202020204" pitchFamily="34" charset="0"/>
+                <a:ea typeface="Arial" panose="020B0604020202020204" pitchFamily="34" charset="0"/>
+                <a:cs typeface="Arial" panose="020B0604020202020204" pitchFamily="34" charset="0"/>
+              </a:rPr>
+              <a:t>: Random forest is a more complex model that can be used for both classification and regression problems. It is an ensemble model that combines multiple decision trees to improve the accuracy of the predictions. Random forests are also relatively easy to interpret and can be used to understand the relationship between the features and the target variable.</a:t>
+            </a:r>
+            <a:endParaRPr lang="en-IN" sz="1100" dirty="0">
+              <a:latin typeface="Arial" panose="020B0604020202020204" pitchFamily="34" charset="0"/>
+              <a:ea typeface="Arial" panose="020B0604020202020204" pitchFamily="34" charset="0"/>
+              <a:cs typeface="Arial" panose="020B0604020202020204" pitchFamily="34" charset="0"/>
+            </a:endParaRPr>
+          </a:p>
+          <a:p>
+            <a:pPr marL="742950" marR="228600" lvl="1" indent="-285750" fontAlgn="base">
+              <a:lnSpc>
+                <a:spcPct val="115000"/>
+              </a:lnSpc>
+              <a:spcAft>
+                <a:spcPts val="0"/>
+              </a:spcAft>
+              <a:buClr>
+                <a:srgbClr val="000000"/>
+              </a:buClr>
+              <a:buSzPts val="1100"/>
+              <a:buFont typeface="+mj-lt"/>
+              <a:buAutoNum type="alphaLcPeriod"/>
+            </a:pPr>
+            <a:r>
+              <a:rPr lang="en-GB" sz="1200" dirty="0">
+                <a:solidFill>
+                  <a:srgbClr val="1F1F1F"/>
+                </a:solidFill>
+                <a:latin typeface="Arial" panose="020B0604020202020204" pitchFamily="34" charset="0"/>
+                <a:ea typeface="Arial" panose="020B0604020202020204" pitchFamily="34" charset="0"/>
+                <a:cs typeface="Arial" panose="020B0604020202020204" pitchFamily="34" charset="0"/>
+              </a:rPr>
+              <a:t>It is a powerful model that can achieve high accuracy.</a:t>
+            </a:r>
+            <a:endParaRPr lang="en-IN" sz="1100" dirty="0">
+              <a:latin typeface="Arial" panose="020B0604020202020204" pitchFamily="34" charset="0"/>
+              <a:ea typeface="Arial" panose="020B0604020202020204" pitchFamily="34" charset="0"/>
+              <a:cs typeface="Arial" panose="020B0604020202020204" pitchFamily="34" charset="0"/>
+            </a:endParaRPr>
+          </a:p>
+          <a:p>
+            <a:pPr marL="742950" marR="228600" lvl="1" indent="-285750" fontAlgn="base">
+              <a:lnSpc>
+                <a:spcPct val="115000"/>
+              </a:lnSpc>
+              <a:spcAft>
+                <a:spcPts val="0"/>
+              </a:spcAft>
+              <a:buClr>
+                <a:srgbClr val="000000"/>
+              </a:buClr>
+              <a:buSzPts val="1100"/>
+              <a:buFont typeface="+mj-lt"/>
+              <a:buAutoNum type="alphaLcPeriod"/>
+            </a:pPr>
+            <a:r>
+              <a:rPr lang="en-GB" sz="1200" dirty="0">
+                <a:solidFill>
+                  <a:srgbClr val="1F1F1F"/>
+                </a:solidFill>
+                <a:latin typeface="Arial" panose="020B0604020202020204" pitchFamily="34" charset="0"/>
+                <a:ea typeface="Arial" panose="020B0604020202020204" pitchFamily="34" charset="0"/>
+                <a:cs typeface="Arial" panose="020B0604020202020204" pitchFamily="34" charset="0"/>
+              </a:rPr>
+              <a:t>It is relatively robust to overfitting.</a:t>
+            </a:r>
+            <a:endParaRPr lang="en-IN" sz="1100" dirty="0">
+              <a:latin typeface="Arial" panose="020B0604020202020204" pitchFamily="34" charset="0"/>
+              <a:ea typeface="Arial" panose="020B0604020202020204" pitchFamily="34" charset="0"/>
+              <a:cs typeface="Arial" panose="020B0604020202020204" pitchFamily="34" charset="0"/>
+            </a:endParaRPr>
+          </a:p>
+          <a:p>
+            <a:pPr marL="342900" marR="228600" lvl="0" indent="-342900" fontAlgn="base">
+              <a:lnSpc>
+                <a:spcPct val="115000"/>
+              </a:lnSpc>
+              <a:spcBef>
+                <a:spcPts val="600"/>
+              </a:spcBef>
+              <a:spcAft>
+                <a:spcPts val="0"/>
+              </a:spcAft>
+              <a:buClr>
+                <a:srgbClr val="1F1F1F"/>
+              </a:buClr>
+              <a:buSzPts val="1200"/>
+              <a:buFont typeface="Arial" panose="020B0604020202020204" pitchFamily="34" charset="0"/>
+              <a:buChar char="●"/>
+            </a:pPr>
+            <a:r>
+              <a:rPr lang="en-GB" sz="1200" b="1" dirty="0">
+                <a:solidFill>
+                  <a:srgbClr val="1F1F1F"/>
+                </a:solidFill>
+                <a:latin typeface="Arial" panose="020B0604020202020204" pitchFamily="34" charset="0"/>
+                <a:ea typeface="Arial" panose="020B0604020202020204" pitchFamily="34" charset="0"/>
+                <a:cs typeface="Arial" panose="020B0604020202020204" pitchFamily="34" charset="0"/>
+              </a:rPr>
+              <a:t>Decision tree</a:t>
+            </a:r>
+            <a:r>
+              <a:rPr lang="en-GB" sz="1200" dirty="0">
+                <a:solidFill>
+                  <a:srgbClr val="1F1F1F"/>
+                </a:solidFill>
+                <a:latin typeface="Arial" panose="020B0604020202020204" pitchFamily="34" charset="0"/>
+                <a:ea typeface="Arial" panose="020B0604020202020204" pitchFamily="34" charset="0"/>
+                <a:cs typeface="Arial" panose="020B0604020202020204" pitchFamily="34" charset="0"/>
+              </a:rPr>
+              <a:t>: Decision trees are a simple but effective model for classification problems. They can be used to predict the target variable by creating a decision tree that branches out based on the features. Decision trees are also relatively easy to interpret.</a:t>
+            </a:r>
+            <a:endParaRPr lang="en-IN" sz="1100" dirty="0">
+              <a:latin typeface="Arial" panose="020B0604020202020204" pitchFamily="34" charset="0"/>
+              <a:ea typeface="Arial" panose="020B0604020202020204" pitchFamily="34" charset="0"/>
+              <a:cs typeface="Arial" panose="020B0604020202020204" pitchFamily="34" charset="0"/>
+            </a:endParaRPr>
+          </a:p>
+          <a:p>
+            <a:pPr marL="742950" marR="228600" lvl="1" indent="-285750" fontAlgn="base">
+              <a:lnSpc>
+                <a:spcPct val="115000"/>
+              </a:lnSpc>
+              <a:spcAft>
+                <a:spcPts val="0"/>
+              </a:spcAft>
+              <a:buClr>
+                <a:srgbClr val="000000"/>
+              </a:buClr>
+              <a:buSzPts val="1100"/>
+              <a:buFont typeface="+mj-lt"/>
+              <a:buAutoNum type="alphaLcPeriod"/>
+            </a:pPr>
+            <a:r>
+              <a:rPr lang="en-GB" sz="1200" dirty="0">
+                <a:solidFill>
+                  <a:srgbClr val="1F1F1F"/>
+                </a:solidFill>
+                <a:latin typeface="Arial" panose="020B0604020202020204" pitchFamily="34" charset="0"/>
+                <a:ea typeface="Arial" panose="020B0604020202020204" pitchFamily="34" charset="0"/>
+                <a:cs typeface="Arial" panose="020B0604020202020204" pitchFamily="34" charset="0"/>
+              </a:rPr>
+              <a:t>It is a simple and easy-to-understand model.</a:t>
+            </a:r>
+            <a:endParaRPr lang="en-IN" sz="1100" dirty="0">
+              <a:latin typeface="Arial" panose="020B0604020202020204" pitchFamily="34" charset="0"/>
+              <a:ea typeface="Arial" panose="020B0604020202020204" pitchFamily="34" charset="0"/>
+              <a:cs typeface="Arial" panose="020B0604020202020204" pitchFamily="34" charset="0"/>
+            </a:endParaRPr>
+          </a:p>
+          <a:p>
+            <a:pPr marL="742950" marR="228600" lvl="1" indent="-285750" fontAlgn="base">
+              <a:lnSpc>
+                <a:spcPct val="115000"/>
+              </a:lnSpc>
+              <a:spcAft>
+                <a:spcPts val="0"/>
+              </a:spcAft>
+              <a:buClr>
+                <a:srgbClr val="000000"/>
+              </a:buClr>
+              <a:buSzPts val="1100"/>
+              <a:buFont typeface="+mj-lt"/>
+              <a:buAutoNum type="alphaLcPeriod"/>
+            </a:pPr>
+            <a:r>
+              <a:rPr lang="en-GB" sz="1200" dirty="0">
+                <a:solidFill>
+                  <a:srgbClr val="1F1F1F"/>
+                </a:solidFill>
+                <a:latin typeface="Arial" panose="020B0604020202020204" pitchFamily="34" charset="0"/>
+                <a:ea typeface="Arial" panose="020B0604020202020204" pitchFamily="34" charset="0"/>
+                <a:cs typeface="Arial" panose="020B0604020202020204" pitchFamily="34" charset="0"/>
+              </a:rPr>
+              <a:t>It can be used for both classification and regression problems.</a:t>
+            </a:r>
+            <a:endParaRPr lang="en-IN" sz="1100" dirty="0">
+              <a:latin typeface="Arial" panose="020B0604020202020204" pitchFamily="34" charset="0"/>
+              <a:ea typeface="Arial" panose="020B0604020202020204" pitchFamily="34" charset="0"/>
+              <a:cs typeface="Arial" panose="020B0604020202020204" pitchFamily="34" charset="0"/>
+            </a:endParaRPr>
+          </a:p>
+          <a:p>
+            <a:pPr marL="742950" marR="228600" lvl="1" indent="-285750" fontAlgn="base">
+              <a:lnSpc>
+                <a:spcPct val="115000"/>
+              </a:lnSpc>
+              <a:spcAft>
+                <a:spcPts val="1000"/>
+              </a:spcAft>
+              <a:buClr>
+                <a:srgbClr val="000000"/>
+              </a:buClr>
+              <a:buSzPts val="1100"/>
+              <a:buFont typeface="+mj-lt"/>
+              <a:buAutoNum type="alphaLcPeriod"/>
+            </a:pPr>
+            <a:r>
+              <a:rPr lang="en-GB" sz="1200" dirty="0">
+                <a:solidFill>
+                  <a:srgbClr val="1F1F1F"/>
+                </a:solidFill>
+                <a:latin typeface="Arial" panose="020B0604020202020204" pitchFamily="34" charset="0"/>
+                <a:ea typeface="Arial" panose="020B0604020202020204" pitchFamily="34" charset="0"/>
+                <a:cs typeface="Arial" panose="020B0604020202020204" pitchFamily="34" charset="0"/>
+              </a:rPr>
+              <a:t>It can be used to identify important features.</a:t>
+            </a:r>
+            <a:endParaRPr lang="en-IN" sz="1100" dirty="0">
+              <a:latin typeface="Arial" panose="020B0604020202020204" pitchFamily="34" charset="0"/>
+              <a:ea typeface="Arial" panose="020B0604020202020204" pitchFamily="34" charset="0"/>
+              <a:cs typeface="Arial" panose="020B0604020202020204" pitchFamily="34" charset="0"/>
+            </a:endParaRPr>
+          </a:p>
+          <a:p>
+            <a:pPr marL="342900" marR="228600" lvl="0" indent="-342900" fontAlgn="base">
+              <a:lnSpc>
+                <a:spcPct val="115000"/>
+              </a:lnSpc>
+              <a:spcBef>
+                <a:spcPts val="600"/>
+              </a:spcBef>
+              <a:spcAft>
+                <a:spcPts val="0"/>
+              </a:spcAft>
+              <a:buClr>
+                <a:srgbClr val="1F1F1F"/>
+              </a:buClr>
+              <a:buSzPts val="1200"/>
+              <a:buFont typeface="Arial" panose="020B0604020202020204" pitchFamily="34" charset="0"/>
+              <a:buChar char="●"/>
+            </a:pPr>
+            <a:r>
+              <a:rPr lang="en-GB" sz="1200" b="1" dirty="0" err="1">
+                <a:solidFill>
+                  <a:srgbClr val="1F1F1F"/>
+                </a:solidFill>
+                <a:latin typeface="Arial" panose="020B0604020202020204" pitchFamily="34" charset="0"/>
+                <a:ea typeface="Arial" panose="020B0604020202020204" pitchFamily="34" charset="0"/>
+                <a:cs typeface="Arial" panose="020B0604020202020204" pitchFamily="34" charset="0"/>
+              </a:rPr>
+              <a:t>XGBoost</a:t>
+            </a:r>
+            <a:r>
+              <a:rPr lang="en-GB" sz="1200" dirty="0">
+                <a:solidFill>
+                  <a:srgbClr val="1F1F1F"/>
+                </a:solidFill>
+                <a:latin typeface="Arial" panose="020B0604020202020204" pitchFamily="34" charset="0"/>
+                <a:ea typeface="Arial" panose="020B0604020202020204" pitchFamily="34" charset="0"/>
+                <a:cs typeface="Arial" panose="020B0604020202020204" pitchFamily="34" charset="0"/>
+              </a:rPr>
+              <a:t>: </a:t>
+            </a:r>
+            <a:r>
+              <a:rPr lang="en-GB" sz="1200" dirty="0" err="1">
+                <a:solidFill>
+                  <a:srgbClr val="1F1F1F"/>
+                </a:solidFill>
+                <a:latin typeface="Arial" panose="020B0604020202020204" pitchFamily="34" charset="0"/>
+                <a:ea typeface="Arial" panose="020B0604020202020204" pitchFamily="34" charset="0"/>
+                <a:cs typeface="Arial" panose="020B0604020202020204" pitchFamily="34" charset="0"/>
+              </a:rPr>
+              <a:t>XGBoost</a:t>
+            </a:r>
+            <a:r>
+              <a:rPr lang="en-GB" sz="1200" dirty="0">
+                <a:solidFill>
+                  <a:srgbClr val="1F1F1F"/>
+                </a:solidFill>
+                <a:latin typeface="Arial" panose="020B0604020202020204" pitchFamily="34" charset="0"/>
+                <a:ea typeface="Arial" panose="020B0604020202020204" pitchFamily="34" charset="0"/>
+                <a:cs typeface="Arial" panose="020B0604020202020204" pitchFamily="34" charset="0"/>
+              </a:rPr>
+              <a:t> is a powerful gradient-boosting algorithm that can be used for both classification and regression problems. It is known for its accuracy and speed. </a:t>
+            </a:r>
+            <a:r>
+              <a:rPr lang="en-GB" sz="1200" dirty="0" err="1">
+                <a:solidFill>
+                  <a:srgbClr val="1F1F1F"/>
+                </a:solidFill>
+                <a:latin typeface="Arial" panose="020B0604020202020204" pitchFamily="34" charset="0"/>
+                <a:ea typeface="Arial" panose="020B0604020202020204" pitchFamily="34" charset="0"/>
+                <a:cs typeface="Arial" panose="020B0604020202020204" pitchFamily="34" charset="0"/>
+              </a:rPr>
+              <a:t>XGBoost</a:t>
+            </a:r>
+            <a:r>
+              <a:rPr lang="en-GB" sz="1200" dirty="0">
+                <a:solidFill>
+                  <a:srgbClr val="1F1F1F"/>
+                </a:solidFill>
+                <a:latin typeface="Arial" panose="020B0604020202020204" pitchFamily="34" charset="0"/>
+                <a:ea typeface="Arial" panose="020B0604020202020204" pitchFamily="34" charset="0"/>
+                <a:cs typeface="Arial" panose="020B0604020202020204" pitchFamily="34" charset="0"/>
+              </a:rPr>
+              <a:t> can be difficult to interpret, but it can be used to understand the relationship between the features and the target variable by looking at the feature importance scores.</a:t>
+            </a:r>
+            <a:endParaRPr lang="en-IN" sz="1100" dirty="0">
+              <a:latin typeface="Arial" panose="020B0604020202020204" pitchFamily="34" charset="0"/>
+              <a:ea typeface="Arial" panose="020B0604020202020204" pitchFamily="34" charset="0"/>
+              <a:cs typeface="Arial" panose="020B0604020202020204" pitchFamily="34" charset="0"/>
+            </a:endParaRPr>
+          </a:p>
+          <a:p>
+            <a:pPr marL="742950" marR="228600" lvl="1" indent="-285750" fontAlgn="base">
+              <a:lnSpc>
+                <a:spcPct val="115000"/>
+              </a:lnSpc>
+              <a:spcAft>
+                <a:spcPts val="0"/>
+              </a:spcAft>
+              <a:buClr>
+                <a:srgbClr val="000000"/>
+              </a:buClr>
+              <a:buSzPts val="1100"/>
+              <a:buFont typeface="+mj-lt"/>
+              <a:buAutoNum type="alphaLcPeriod"/>
+            </a:pPr>
+            <a:r>
+              <a:rPr lang="en-GB" sz="1200" dirty="0">
+                <a:solidFill>
+                  <a:srgbClr val="1F1F1F"/>
+                </a:solidFill>
+                <a:latin typeface="Arial" panose="020B0604020202020204" pitchFamily="34" charset="0"/>
+                <a:ea typeface="Arial" panose="020B0604020202020204" pitchFamily="34" charset="0"/>
+                <a:cs typeface="Arial" panose="020B0604020202020204" pitchFamily="34" charset="0"/>
+              </a:rPr>
+              <a:t>It is a powerful model that can achieve high accuracy.</a:t>
+            </a:r>
+            <a:endParaRPr lang="en-IN" sz="1100" dirty="0">
+              <a:latin typeface="Arial" panose="020B0604020202020204" pitchFamily="34" charset="0"/>
+              <a:ea typeface="Arial" panose="020B0604020202020204" pitchFamily="34" charset="0"/>
+              <a:cs typeface="Arial" panose="020B0604020202020204" pitchFamily="34" charset="0"/>
+            </a:endParaRPr>
+          </a:p>
+          <a:p>
+            <a:pPr marL="742950" marR="228600" lvl="1" indent="-285750" fontAlgn="base">
+              <a:lnSpc>
+                <a:spcPct val="115000"/>
+              </a:lnSpc>
+              <a:spcAft>
+                <a:spcPts val="0"/>
+              </a:spcAft>
+              <a:buClr>
+                <a:srgbClr val="000000"/>
+              </a:buClr>
+              <a:buSzPts val="1100"/>
+              <a:buFont typeface="+mj-lt"/>
+              <a:buAutoNum type="alphaLcPeriod"/>
+            </a:pPr>
+            <a:r>
+              <a:rPr lang="en-GB" sz="1200" dirty="0">
+                <a:solidFill>
+                  <a:srgbClr val="1F1F1F"/>
+                </a:solidFill>
+                <a:latin typeface="Arial" panose="020B0604020202020204" pitchFamily="34" charset="0"/>
+                <a:ea typeface="Arial" panose="020B0604020202020204" pitchFamily="34" charset="0"/>
+                <a:cs typeface="Arial" panose="020B0604020202020204" pitchFamily="34" charset="0"/>
+              </a:rPr>
+              <a:t>It is relatively robust to overfitting.</a:t>
+            </a:r>
+            <a:endParaRPr lang="en-IN" sz="1100" u="none" strike="noStrike" dirty="0">
+              <a:effectLst/>
+              <a:latin typeface="Arial" panose="020B0604020202020204" pitchFamily="34" charset="0"/>
+              <a:ea typeface="Arial" panose="020B0604020202020204" pitchFamily="34" charset="0"/>
+              <a:cs typeface="Arial" panose="020B0604020202020204" pitchFamily="34" charset="0"/>
+            </a:endParaRPr>
+          </a:p>
+        </p:txBody>
+      </p:sp>
+    </p:spTree>
+    <p:extLst>
+      <p:ext uri="{BB962C8B-B14F-4D97-AF65-F5344CB8AC3E}">
+        <p14:creationId xmlns:p14="http://schemas.microsoft.com/office/powerpoint/2010/main" val="2424154893"/>
+      </p:ext>
+    </p:extLst>
+  </p:cSld>
+  <p:clrMapOvr>
+    <a:masterClrMapping/>
+  </p:clrMapOvr>
+</p:sld>
+</file>
+
+<file path=ppt/slides/slide24.xml><?xml version="1.0" encoding="utf-8"?>
+<p:sld xmlns:a="http://schemas.openxmlformats.org/drawingml/2006/main" xmlns:r="http://schemas.openxmlformats.org/officeDocument/2006/relationships" xmlns:p="http://schemas.openxmlformats.org/presentationml/2006/main">
+  <p:cSld>
+    <p:spTree>
+      <p:nvGrpSpPr>
+        <p:cNvPr id="1" name=""/>
+        <p:cNvGrpSpPr/>
+        <p:nvPr/>
+      </p:nvGrpSpPr>
+      <p:grpSpPr>
+        <a:xfrm>
+          <a:off x="0" y="0"/>
+          <a:ext cx="0" cy="0"/>
+          <a:chOff x="0" y="0"/>
+          <a:chExt cx="0" cy="0"/>
+        </a:xfrm>
+      </p:grpSpPr>
+      <p:sp>
+        <p:nvSpPr>
+          <p:cNvPr id="5" name="TextBox 4"/>
+          <p:cNvSpPr txBox="1"/>
+          <p:nvPr/>
+        </p:nvSpPr>
+        <p:spPr>
+          <a:xfrm>
+            <a:off x="0" y="0"/>
+            <a:ext cx="3002145" cy="6858000"/>
+          </a:xfrm>
+          <a:prstGeom prst="rect">
+            <a:avLst/>
+          </a:prstGeom>
+          <a:solidFill>
+            <a:srgbClr val="3B3B3B"/>
+          </a:solidFill>
+        </p:spPr>
+        <p:txBody>
+          <a:bodyPr wrap="square" rtlCol="0">
+            <a:spAutoFit/>
+          </a:bodyPr>
+          <a:lstStyle/>
+          <a:p>
+            <a:endParaRPr lang="en-GB" dirty="0"/>
+          </a:p>
+        </p:txBody>
+      </p:sp>
+      <p:pic>
+        <p:nvPicPr>
+          <p:cNvPr id="6" name="Picture 5"/>
+          <p:cNvPicPr>
+            <a:picLocks noChangeAspect="1"/>
+          </p:cNvPicPr>
+          <p:nvPr/>
+        </p:nvPicPr>
+        <p:blipFill>
+          <a:blip r:embed="rId2"/>
+          <a:stretch>
+            <a:fillRect/>
+          </a:stretch>
+        </p:blipFill>
+        <p:spPr>
+          <a:xfrm>
+            <a:off x="176495" y="-729821"/>
+            <a:ext cx="2322777" cy="2475191"/>
+          </a:xfrm>
+          <a:prstGeom prst="rect">
+            <a:avLst/>
+          </a:prstGeom>
+        </p:spPr>
+      </p:pic>
+      <p:sp>
+        <p:nvSpPr>
+          <p:cNvPr id="2" name="Rectangle 1"/>
+          <p:cNvSpPr/>
+          <p:nvPr/>
+        </p:nvSpPr>
+        <p:spPr>
+          <a:xfrm>
+            <a:off x="3415994" y="82771"/>
+            <a:ext cx="4038863" cy="584775"/>
+          </a:xfrm>
+          <a:prstGeom prst="rect">
+            <a:avLst/>
+          </a:prstGeom>
+        </p:spPr>
+        <p:txBody>
+          <a:bodyPr wrap="none">
+            <a:spAutoFit/>
+          </a:bodyPr>
+          <a:lstStyle/>
+          <a:p>
+            <a:r>
+              <a:rPr lang="en-GB" sz="3200" dirty="0">
+                <a:solidFill>
+                  <a:srgbClr val="FF6600"/>
+                </a:solidFill>
+              </a:rPr>
+              <a:t>Recommended Models</a:t>
+            </a:r>
+          </a:p>
+        </p:txBody>
+      </p:sp>
+      <p:sp>
+        <p:nvSpPr>
+          <p:cNvPr id="3" name="Rectangle 2"/>
+          <p:cNvSpPr/>
+          <p:nvPr/>
+        </p:nvSpPr>
+        <p:spPr>
+          <a:xfrm>
+            <a:off x="3415994" y="667546"/>
+            <a:ext cx="8406812" cy="523220"/>
+          </a:xfrm>
+          <a:prstGeom prst="rect">
+            <a:avLst/>
+          </a:prstGeom>
+        </p:spPr>
+        <p:txBody>
+          <a:bodyPr wrap="square">
+            <a:spAutoFit/>
+          </a:bodyPr>
+          <a:lstStyle/>
+          <a:p>
+            <a:endParaRPr lang="en-GB" sz="1400" dirty="0"/>
+          </a:p>
+          <a:p>
+            <a:endParaRPr lang="en-GB" sz="1400" dirty="0"/>
+          </a:p>
+        </p:txBody>
+      </p:sp>
+      <p:sp>
+        <p:nvSpPr>
+          <p:cNvPr id="7" name="TextBox 6">
+            <a:extLst>
+              <a:ext uri="{FF2B5EF4-FFF2-40B4-BE49-F238E27FC236}">
+                <a16:creationId xmlns:a16="http://schemas.microsoft.com/office/drawing/2014/main" id="{AB004D54-61DF-EB04-3FF0-2B3A7256AE57}"/>
+              </a:ext>
+            </a:extLst>
+          </p:cNvPr>
+          <p:cNvSpPr txBox="1"/>
+          <p:nvPr/>
+        </p:nvSpPr>
+        <p:spPr>
+          <a:xfrm>
+            <a:off x="3415994" y="762009"/>
+            <a:ext cx="8406812" cy="923330"/>
+          </a:xfrm>
+          <a:prstGeom prst="rect">
+            <a:avLst/>
+          </a:prstGeom>
+          <a:noFill/>
+        </p:spPr>
+        <p:txBody>
+          <a:bodyPr wrap="square">
+            <a:spAutoFit/>
+          </a:bodyPr>
+          <a:lstStyle/>
+          <a:p>
+            <a:r>
+              <a:rPr lang="en-GB" sz="1800" b="1" dirty="0">
+                <a:solidFill>
+                  <a:schemeClr val="accent2">
+                    <a:lumMod val="75000"/>
+                  </a:schemeClr>
+                </a:solidFill>
+              </a:rPr>
+              <a:t>We have 8 categorical Variables and 7 numeric variables in the data after cleaning the data in week 10. We can make these models in the upcoming weeks:</a:t>
+            </a:r>
+            <a:r>
+              <a:rPr lang="en-IN" sz="1800" dirty="0">
+                <a:solidFill>
+                  <a:schemeClr val="accent2">
+                    <a:lumMod val="75000"/>
+                  </a:schemeClr>
+                </a:solidFill>
+              </a:rPr>
+              <a:t/>
+            </a:r>
+            <a:br>
+              <a:rPr lang="en-IN" sz="1800" dirty="0">
+                <a:solidFill>
+                  <a:schemeClr val="accent2">
+                    <a:lumMod val="75000"/>
+                  </a:schemeClr>
+                </a:solidFill>
+              </a:rPr>
+            </a:br>
+            <a:endParaRPr lang="en-AE" dirty="0"/>
+          </a:p>
+        </p:txBody>
+      </p:sp>
+      <p:sp>
+        <p:nvSpPr>
+          <p:cNvPr id="4" name="Rectangle 3">
+            <a:extLst>
+              <a:ext uri="{FF2B5EF4-FFF2-40B4-BE49-F238E27FC236}">
+                <a16:creationId xmlns:a16="http://schemas.microsoft.com/office/drawing/2014/main" id="{6DC86540-3067-3654-21B2-FD5F8D2D9802}"/>
+              </a:ext>
+            </a:extLst>
+          </p:cNvPr>
+          <p:cNvSpPr/>
+          <p:nvPr/>
+        </p:nvSpPr>
+        <p:spPr>
+          <a:xfrm>
+            <a:off x="3527431" y="1685339"/>
+            <a:ext cx="8076965" cy="4805611"/>
+          </a:xfrm>
+          <a:prstGeom prst="rect">
+            <a:avLst/>
+          </a:prstGeom>
+          <a:solidFill>
+            <a:schemeClr val="accent2">
+              <a:lumMod val="60000"/>
+              <a:lumOff val="40000"/>
+            </a:schemeClr>
+          </a:solidFill>
+        </p:spPr>
+        <p:txBody>
+          <a:bodyPr wrap="square">
+            <a:spAutoFit/>
+          </a:bodyPr>
+          <a:lstStyle/>
+          <a:p>
+            <a:pPr marL="342900" marR="228600" lvl="0" indent="-342900" fontAlgn="base">
+              <a:lnSpc>
+                <a:spcPct val="115000"/>
+              </a:lnSpc>
+              <a:spcBef>
+                <a:spcPts val="600"/>
+              </a:spcBef>
+              <a:spcAft>
+                <a:spcPts val="0"/>
+              </a:spcAft>
+              <a:buClr>
+                <a:srgbClr val="1F1F1F"/>
+              </a:buClr>
+              <a:buSzPts val="1200"/>
+              <a:buFont typeface="Arial" panose="020B0604020202020204" pitchFamily="34" charset="0"/>
+              <a:buChar char="●"/>
+            </a:pPr>
+            <a:r>
+              <a:rPr lang="en-GB" sz="1200" b="1" dirty="0">
+                <a:solidFill>
+                  <a:srgbClr val="1F1F1F"/>
+                </a:solidFill>
+                <a:latin typeface="Arial" panose="020B0604020202020204" pitchFamily="34" charset="0"/>
+                <a:ea typeface="Arial" panose="020B0604020202020204" pitchFamily="34" charset="0"/>
+                <a:cs typeface="Arial" panose="020B0604020202020204" pitchFamily="34" charset="0"/>
+              </a:rPr>
+              <a:t>KNN</a:t>
+            </a:r>
+            <a:r>
+              <a:rPr lang="en-GB" sz="1200" dirty="0">
+                <a:solidFill>
+                  <a:srgbClr val="1F1F1F"/>
+                </a:solidFill>
+                <a:latin typeface="Arial" panose="020B0604020202020204" pitchFamily="34" charset="0"/>
+                <a:ea typeface="Arial" panose="020B0604020202020204" pitchFamily="34" charset="0"/>
+                <a:cs typeface="Arial" panose="020B0604020202020204" pitchFamily="34" charset="0"/>
+              </a:rPr>
+              <a:t>: KNN is a non-parametric model that can be used for both classification and regression problems. It works by finding the K most similar data points to a new data point and then predicting the label of the new data point based on the labels of the K nearest neighbours. KNN is relatively simple to implement and can be used to understand the relationship between the features and the target variable by looking at the K nearest neighbours of a new data point.</a:t>
+            </a:r>
+            <a:endParaRPr lang="en-IN" sz="1100" dirty="0">
+              <a:latin typeface="Arial" panose="020B0604020202020204" pitchFamily="34" charset="0"/>
+              <a:ea typeface="Arial" panose="020B0604020202020204" pitchFamily="34" charset="0"/>
+              <a:cs typeface="Arial" panose="020B0604020202020204" pitchFamily="34" charset="0"/>
+            </a:endParaRPr>
+          </a:p>
+          <a:p>
+            <a:pPr marL="742950" marR="228600" lvl="1" indent="-285750" fontAlgn="base">
+              <a:lnSpc>
+                <a:spcPct val="115000"/>
+              </a:lnSpc>
+              <a:spcAft>
+                <a:spcPts val="0"/>
+              </a:spcAft>
+              <a:buClr>
+                <a:srgbClr val="000000"/>
+              </a:buClr>
+              <a:buSzPts val="1100"/>
+              <a:buFont typeface="+mj-lt"/>
+              <a:buAutoNum type="alphaLcPeriod"/>
+            </a:pPr>
+            <a:r>
+              <a:rPr lang="en-GB" sz="1200" dirty="0">
+                <a:solidFill>
+                  <a:srgbClr val="1F1F1F"/>
+                </a:solidFill>
+                <a:latin typeface="Arial" panose="020B0604020202020204" pitchFamily="34" charset="0"/>
+                <a:ea typeface="Arial" panose="020B0604020202020204" pitchFamily="34" charset="0"/>
+                <a:cs typeface="Arial" panose="020B0604020202020204" pitchFamily="34" charset="0"/>
+              </a:rPr>
+              <a:t>It is a simple and easy-to-understand model.</a:t>
+            </a:r>
+            <a:endParaRPr lang="en-IN" sz="1100" dirty="0">
+              <a:latin typeface="Arial" panose="020B0604020202020204" pitchFamily="34" charset="0"/>
+              <a:ea typeface="Arial" panose="020B0604020202020204" pitchFamily="34" charset="0"/>
+              <a:cs typeface="Arial" panose="020B0604020202020204" pitchFamily="34" charset="0"/>
+            </a:endParaRPr>
+          </a:p>
+          <a:p>
+            <a:pPr marL="742950" marR="228600" lvl="1" indent="-285750" fontAlgn="base">
+              <a:lnSpc>
+                <a:spcPct val="115000"/>
+              </a:lnSpc>
+              <a:spcAft>
+                <a:spcPts val="0"/>
+              </a:spcAft>
+              <a:buClr>
+                <a:srgbClr val="000000"/>
+              </a:buClr>
+              <a:buSzPts val="1100"/>
+              <a:buFont typeface="+mj-lt"/>
+              <a:buAutoNum type="alphaLcPeriod"/>
+            </a:pPr>
+            <a:r>
+              <a:rPr lang="en-GB" sz="1200" dirty="0">
+                <a:solidFill>
+                  <a:srgbClr val="1F1F1F"/>
+                </a:solidFill>
+                <a:latin typeface="Arial" panose="020B0604020202020204" pitchFamily="34" charset="0"/>
+                <a:ea typeface="Arial" panose="020B0604020202020204" pitchFamily="34" charset="0"/>
+                <a:cs typeface="Arial" panose="020B0604020202020204" pitchFamily="34" charset="0"/>
+              </a:rPr>
+              <a:t>It is relatively fast to train.</a:t>
+            </a:r>
+            <a:endParaRPr lang="en-IN" sz="1100" dirty="0">
+              <a:latin typeface="Arial" panose="020B0604020202020204" pitchFamily="34" charset="0"/>
+              <a:ea typeface="Arial" panose="020B0604020202020204" pitchFamily="34" charset="0"/>
+              <a:cs typeface="Arial" panose="020B0604020202020204" pitchFamily="34" charset="0"/>
+            </a:endParaRPr>
+          </a:p>
+          <a:p>
+            <a:pPr marR="228600">
+              <a:lnSpc>
+                <a:spcPct val="115000"/>
+              </a:lnSpc>
+              <a:spcAft>
+                <a:spcPts val="0"/>
+              </a:spcAft>
+            </a:pPr>
+            <a:r>
+              <a:rPr lang="en-GB" sz="1100" dirty="0">
+                <a:latin typeface="Arial" panose="020B0604020202020204" pitchFamily="34" charset="0"/>
+                <a:ea typeface="Arial" panose="020B0604020202020204" pitchFamily="34" charset="0"/>
+              </a:rPr>
+              <a:t> </a:t>
+            </a:r>
+            <a:endParaRPr lang="en-IN" sz="1100" dirty="0">
+              <a:latin typeface="Arial" panose="020B0604020202020204" pitchFamily="34" charset="0"/>
+              <a:ea typeface="Arial" panose="020B0604020202020204" pitchFamily="34" charset="0"/>
+            </a:endParaRPr>
+          </a:p>
+          <a:p>
+            <a:pPr marL="342900" marR="228600" lvl="0" indent="-342900" fontAlgn="base">
+              <a:lnSpc>
+                <a:spcPct val="115000"/>
+              </a:lnSpc>
+              <a:spcAft>
+                <a:spcPts val="0"/>
+              </a:spcAft>
+              <a:buClr>
+                <a:srgbClr val="1F1F1F"/>
+              </a:buClr>
+              <a:buSzPts val="1200"/>
+              <a:buFont typeface="Arial" panose="020B0604020202020204" pitchFamily="34" charset="0"/>
+              <a:buChar char="●"/>
+            </a:pPr>
+            <a:r>
+              <a:rPr lang="en-GB" sz="1200" b="1" dirty="0">
+                <a:solidFill>
+                  <a:srgbClr val="1F1F1F"/>
+                </a:solidFill>
+                <a:latin typeface="Arial" panose="020B0604020202020204" pitchFamily="34" charset="0"/>
+                <a:ea typeface="Arial" panose="020B0604020202020204" pitchFamily="34" charset="0"/>
+                <a:cs typeface="Arial" panose="020B0604020202020204" pitchFamily="34" charset="0"/>
+              </a:rPr>
+              <a:t>Gradient boosting</a:t>
+            </a:r>
+            <a:r>
+              <a:rPr lang="en-GB" sz="1200" dirty="0">
+                <a:solidFill>
+                  <a:srgbClr val="1F1F1F"/>
+                </a:solidFill>
+                <a:latin typeface="Arial" panose="020B0604020202020204" pitchFamily="34" charset="0"/>
+                <a:ea typeface="Arial" panose="020B0604020202020204" pitchFamily="34" charset="0"/>
+                <a:cs typeface="Arial" panose="020B0604020202020204" pitchFamily="34" charset="0"/>
+              </a:rPr>
+              <a:t>: Gradient boosting is an ensemble learning method that can be used for both classification and regression problems. It works by iteratively adding new models to correct the errors made by previous models. Gradient boosting can be difficult to interpret, but it can be used to understand the relationship between the features and the target variable by looking at the feature importance scores.</a:t>
+            </a:r>
+            <a:endParaRPr lang="en-IN" sz="1100" dirty="0">
+              <a:latin typeface="Arial" panose="020B0604020202020204" pitchFamily="34" charset="0"/>
+              <a:ea typeface="Arial" panose="020B0604020202020204" pitchFamily="34" charset="0"/>
+              <a:cs typeface="Arial" panose="020B0604020202020204" pitchFamily="34" charset="0"/>
+            </a:endParaRPr>
+          </a:p>
+          <a:p>
+            <a:pPr marL="742950" marR="228600" lvl="1" indent="-285750" fontAlgn="base">
+              <a:lnSpc>
+                <a:spcPct val="115000"/>
+              </a:lnSpc>
+              <a:spcAft>
+                <a:spcPts val="0"/>
+              </a:spcAft>
+              <a:buClr>
+                <a:srgbClr val="000000"/>
+              </a:buClr>
+              <a:buSzPts val="1100"/>
+              <a:buFont typeface="+mj-lt"/>
+              <a:buAutoNum type="alphaLcPeriod"/>
+            </a:pPr>
+            <a:r>
+              <a:rPr lang="en-GB" sz="1200" dirty="0">
+                <a:solidFill>
+                  <a:srgbClr val="1F1F1F"/>
+                </a:solidFill>
+                <a:latin typeface="Arial" panose="020B0604020202020204" pitchFamily="34" charset="0"/>
+                <a:ea typeface="Arial" panose="020B0604020202020204" pitchFamily="34" charset="0"/>
+                <a:cs typeface="Arial" panose="020B0604020202020204" pitchFamily="34" charset="0"/>
+              </a:rPr>
+              <a:t>It is a powerful model that can achieve high accuracy.</a:t>
+            </a:r>
+            <a:endParaRPr lang="en-IN" sz="1100" dirty="0">
+              <a:latin typeface="Arial" panose="020B0604020202020204" pitchFamily="34" charset="0"/>
+              <a:ea typeface="Arial" panose="020B0604020202020204" pitchFamily="34" charset="0"/>
+              <a:cs typeface="Arial" panose="020B0604020202020204" pitchFamily="34" charset="0"/>
+            </a:endParaRPr>
+          </a:p>
+          <a:p>
+            <a:pPr marL="742950" marR="228600" lvl="1" indent="-285750" fontAlgn="base">
+              <a:lnSpc>
+                <a:spcPct val="115000"/>
+              </a:lnSpc>
+              <a:spcAft>
+                <a:spcPts val="0"/>
+              </a:spcAft>
+              <a:buClr>
+                <a:srgbClr val="000000"/>
+              </a:buClr>
+              <a:buSzPts val="1100"/>
+              <a:buFont typeface="+mj-lt"/>
+              <a:buAutoNum type="alphaLcPeriod"/>
+            </a:pPr>
+            <a:r>
+              <a:rPr lang="en-GB" sz="1200" dirty="0">
+                <a:solidFill>
+                  <a:srgbClr val="1F1F1F"/>
+                </a:solidFill>
+                <a:latin typeface="Arial" panose="020B0604020202020204" pitchFamily="34" charset="0"/>
+                <a:ea typeface="Arial" panose="020B0604020202020204" pitchFamily="34" charset="0"/>
+                <a:cs typeface="Arial" panose="020B0604020202020204" pitchFamily="34" charset="0"/>
+              </a:rPr>
+              <a:t>It is relatively robust to overfitting.</a:t>
+            </a:r>
+            <a:endParaRPr lang="en-IN" sz="1100" dirty="0">
+              <a:latin typeface="Arial" panose="020B0604020202020204" pitchFamily="34" charset="0"/>
+              <a:ea typeface="Arial" panose="020B0604020202020204" pitchFamily="34" charset="0"/>
+              <a:cs typeface="Arial" panose="020B0604020202020204" pitchFamily="34" charset="0"/>
+            </a:endParaRPr>
+          </a:p>
+          <a:p>
+            <a:pPr marL="342900" marR="228600" lvl="0" indent="-342900" fontAlgn="base">
+              <a:lnSpc>
+                <a:spcPct val="115000"/>
+              </a:lnSpc>
+              <a:spcBef>
+                <a:spcPts val="600"/>
+              </a:spcBef>
+              <a:spcAft>
+                <a:spcPts val="0"/>
+              </a:spcAft>
+              <a:buClr>
+                <a:srgbClr val="1F1F1F"/>
+              </a:buClr>
+              <a:buSzPts val="1200"/>
+              <a:buFont typeface="Arial" panose="020B0604020202020204" pitchFamily="34" charset="0"/>
+              <a:buChar char="●"/>
+            </a:pPr>
+            <a:r>
+              <a:rPr lang="en-GB" sz="1200" b="1" dirty="0">
+                <a:solidFill>
+                  <a:srgbClr val="1F1F1F"/>
+                </a:solidFill>
+                <a:latin typeface="Arial" panose="020B0604020202020204" pitchFamily="34" charset="0"/>
+                <a:ea typeface="Arial" panose="020B0604020202020204" pitchFamily="34" charset="0"/>
+                <a:cs typeface="Arial" panose="020B0604020202020204" pitchFamily="34" charset="0"/>
+              </a:rPr>
+              <a:t>Voting classifiers</a:t>
+            </a:r>
+            <a:r>
+              <a:rPr lang="en-GB" sz="1200" dirty="0">
+                <a:solidFill>
+                  <a:srgbClr val="1F1F1F"/>
+                </a:solidFill>
+                <a:latin typeface="Arial" panose="020B0604020202020204" pitchFamily="34" charset="0"/>
+                <a:ea typeface="Arial" panose="020B0604020202020204" pitchFamily="34" charset="0"/>
+                <a:cs typeface="Arial" panose="020B0604020202020204" pitchFamily="34" charset="0"/>
+              </a:rPr>
+              <a:t>: Voting classifiers are a type of ensemble learning method that combines the predictions of multiple models to make a final prediction. Voting classifiers can be used to improve the accuracy of the predictions by reducing the variance of the individual models. Voting classifiers can be hard or soft. Hard-voting classifiers make a single prediction for each data point while soft-voting classifiers assign a probability to each class for each data point.</a:t>
+            </a:r>
+            <a:endParaRPr lang="en-IN" sz="1100" dirty="0">
+              <a:latin typeface="Arial" panose="020B0604020202020204" pitchFamily="34" charset="0"/>
+              <a:ea typeface="Arial" panose="020B0604020202020204" pitchFamily="34" charset="0"/>
+              <a:cs typeface="Arial" panose="020B0604020202020204" pitchFamily="34" charset="0"/>
+            </a:endParaRPr>
+          </a:p>
+          <a:p>
+            <a:pPr marL="742950" marR="228600" lvl="1" indent="-285750" fontAlgn="base">
+              <a:lnSpc>
+                <a:spcPct val="115000"/>
+              </a:lnSpc>
+              <a:spcAft>
+                <a:spcPts val="0"/>
+              </a:spcAft>
+              <a:buClr>
+                <a:srgbClr val="000000"/>
+              </a:buClr>
+              <a:buSzPts val="1100"/>
+              <a:buFont typeface="+mj-lt"/>
+              <a:buAutoNum type="alphaLcPeriod"/>
+            </a:pPr>
+            <a:r>
+              <a:rPr lang="en-GB" sz="1200" dirty="0">
+                <a:solidFill>
+                  <a:srgbClr val="1F1F1F"/>
+                </a:solidFill>
+                <a:latin typeface="Arial" panose="020B0604020202020204" pitchFamily="34" charset="0"/>
+                <a:ea typeface="Arial" panose="020B0604020202020204" pitchFamily="34" charset="0"/>
+                <a:cs typeface="Arial" panose="020B0604020202020204" pitchFamily="34" charset="0"/>
+              </a:rPr>
+              <a:t>They can improve the accuracy of predictions by combining the predictions of multiple models.</a:t>
+            </a:r>
+            <a:endParaRPr lang="en-IN" sz="1100" dirty="0">
+              <a:latin typeface="Arial" panose="020B0604020202020204" pitchFamily="34" charset="0"/>
+              <a:ea typeface="Arial" panose="020B0604020202020204" pitchFamily="34" charset="0"/>
+              <a:cs typeface="Arial" panose="020B0604020202020204" pitchFamily="34" charset="0"/>
+            </a:endParaRPr>
+          </a:p>
+          <a:p>
+            <a:pPr marL="742950" marR="228600" lvl="1" indent="-285750" fontAlgn="base">
+              <a:lnSpc>
+                <a:spcPct val="115000"/>
+              </a:lnSpc>
+              <a:spcAft>
+                <a:spcPts val="0"/>
+              </a:spcAft>
+              <a:buClr>
+                <a:srgbClr val="000000"/>
+              </a:buClr>
+              <a:buSzPts val="1100"/>
+              <a:buFont typeface="+mj-lt"/>
+              <a:buAutoNum type="alphaLcPeriod"/>
+            </a:pPr>
+            <a:r>
+              <a:rPr lang="en-GB" sz="1200" dirty="0">
+                <a:solidFill>
+                  <a:srgbClr val="1F1F1F"/>
+                </a:solidFill>
+                <a:latin typeface="Arial" panose="020B0604020202020204" pitchFamily="34" charset="0"/>
+                <a:ea typeface="Arial" panose="020B0604020202020204" pitchFamily="34" charset="0"/>
+                <a:cs typeface="Arial" panose="020B0604020202020204" pitchFamily="34" charset="0"/>
+              </a:rPr>
+              <a:t>They can be used to reduce the variance of predictions.</a:t>
+            </a:r>
+            <a:endParaRPr lang="en-IN" sz="1100" dirty="0">
+              <a:latin typeface="Arial" panose="020B0604020202020204" pitchFamily="34" charset="0"/>
+              <a:ea typeface="Arial" panose="020B0604020202020204" pitchFamily="34" charset="0"/>
+              <a:cs typeface="Arial" panose="020B0604020202020204" pitchFamily="34" charset="0"/>
+            </a:endParaRPr>
+          </a:p>
+          <a:p>
+            <a:pPr marL="742950" marR="228600" lvl="1" indent="-285750" fontAlgn="base">
+              <a:lnSpc>
+                <a:spcPct val="115000"/>
+              </a:lnSpc>
+              <a:spcAft>
+                <a:spcPts val="1400"/>
+              </a:spcAft>
+              <a:buClr>
+                <a:srgbClr val="000000"/>
+              </a:buClr>
+              <a:buSzPts val="1100"/>
+              <a:buFont typeface="+mj-lt"/>
+              <a:buAutoNum type="alphaLcPeriod"/>
+            </a:pPr>
+            <a:r>
+              <a:rPr lang="en-GB" sz="1200" dirty="0">
+                <a:solidFill>
+                  <a:srgbClr val="1F1F1F"/>
+                </a:solidFill>
+                <a:latin typeface="Arial" panose="020B0604020202020204" pitchFamily="34" charset="0"/>
+                <a:ea typeface="Arial" panose="020B0604020202020204" pitchFamily="34" charset="0"/>
+                <a:cs typeface="Arial" panose="020B0604020202020204" pitchFamily="34" charset="0"/>
+              </a:rPr>
+              <a:t>They can be used to improve the robustness of predictions to overfitting.</a:t>
+            </a:r>
+            <a:endParaRPr lang="en-IN" sz="1100" dirty="0">
+              <a:latin typeface="Arial" panose="020B0604020202020204" pitchFamily="34" charset="0"/>
+              <a:ea typeface="Arial" panose="020B0604020202020204" pitchFamily="34" charset="0"/>
+              <a:cs typeface="Arial" panose="020B0604020202020204" pitchFamily="34" charset="0"/>
+            </a:endParaRPr>
+          </a:p>
+        </p:txBody>
+      </p:sp>
+    </p:spTree>
+    <p:extLst>
+      <p:ext uri="{BB962C8B-B14F-4D97-AF65-F5344CB8AC3E}">
+        <p14:creationId xmlns:p14="http://schemas.microsoft.com/office/powerpoint/2010/main" val="741038566"/>
+      </p:ext>
+    </p:extLst>
+  </p:cSld>
+  <p:clrMapOvr>
+    <a:masterClrMapping/>
+  </p:clrMapOvr>
+</p:sld>
+</file>
+
+<file path=ppt/slides/slide25.xml><?xml version="1.0" encoding="utf-8"?>
 <p:sld xmlns:a="http://schemas.openxmlformats.org/drawingml/2006/main" xmlns:r="http://schemas.openxmlformats.org/officeDocument/2006/relationships" xmlns:p="http://schemas.openxmlformats.org/presentationml/2006/main">
   <p:cSld>
     <p:spTree>

</xml_diff>